<commit_message>
add week 4 presentation
</commit_message>
<xml_diff>
--- a/Presentations/4-Advanced ML Model.pptx
+++ b/Presentations/4-Advanced ML Model.pptx
@@ -48,11 +48,11 @@
     <p:sldId id="296" r:id="rId42"/>
     <p:sldId id="297" r:id="rId43"/>
     <p:sldId id="298" r:id="rId44"/>
-    <p:sldId id="310" r:id="rId45"/>
-    <p:sldId id="299" r:id="rId46"/>
-    <p:sldId id="300" r:id="rId47"/>
+    <p:sldId id="299" r:id="rId45"/>
+    <p:sldId id="300" r:id="rId46"/>
+    <p:sldId id="302" r:id="rId47"/>
     <p:sldId id="301" r:id="rId48"/>
-    <p:sldId id="302" r:id="rId49"/>
+    <p:sldId id="310" r:id="rId49"/>
     <p:sldId id="303" r:id="rId50"/>
     <p:sldId id="304" r:id="rId51"/>
     <p:sldId id="305" r:id="rId52"/>
@@ -1021,10 +1021,13 @@
         <a:lstStyle/>
         <a:p>
           <a:r>
-            <a:rPr lang="en-US"/>
-            <a:t>ReLU (Rectified Linear Unit)</a:t>
+            <a:rPr lang="en-US" dirty="0" err="1"/>
+            <a:t>ReLU</a:t>
           </a:r>
-          <a:endParaRPr lang="en-US" dirty="0"/>
+          <a:r>
+            <a:rPr lang="en-US" dirty="0"/>
+            <a:t> (Rectified Linear Unit)</a:t>
+          </a:r>
         </a:p>
       </dgm:t>
     </dgm:pt>
@@ -1577,10 +1580,13 @@
             <a:buNone/>
           </a:pPr>
           <a:r>
-            <a:rPr lang="en-US" sz="2900" kern="1200"/>
-            <a:t>ReLU (Rectified Linear Unit)</a:t>
+            <a:rPr lang="en-US" sz="2900" kern="1200" dirty="0" err="1"/>
+            <a:t>ReLU</a:t>
           </a:r>
-          <a:endParaRPr lang="en-US" sz="2900" kern="1200" dirty="0"/>
+          <a:r>
+            <a:rPr lang="en-US" sz="2900" kern="1200" dirty="0"/>
+            <a:t> (Rectified Linear Unit)</a:t>
+          </a:r>
         </a:p>
       </dsp:txBody>
       <dsp:txXfrm>
@@ -3652,7 +3658,7 @@
           <a:p>
             <a:fld id="{7F067AFB-E8F0-4146-902F-6EBBED2B273E}" type="datetimeFigureOut">
               <a:rPr lang="en-US" smtClean="0"/>
-              <a:t>11/11/2025</a:t>
+              <a:t>16/11/2025</a:t>
             </a:fld>
             <a:endParaRPr lang="en-US"/>
           </a:p>
@@ -3903,7 +3909,7 @@
           <a:p>
             <a:fld id="{7F067AFB-E8F0-4146-902F-6EBBED2B273E}" type="datetimeFigureOut">
               <a:rPr lang="en-US" smtClean="0"/>
-              <a:t>11/11/2025</a:t>
+              <a:t>16/11/2025</a:t>
             </a:fld>
             <a:endParaRPr lang="en-US"/>
           </a:p>
@@ -4217,7 +4223,7 @@
           <a:p>
             <a:fld id="{7F067AFB-E8F0-4146-902F-6EBBED2B273E}" type="datetimeFigureOut">
               <a:rPr lang="en-US" smtClean="0"/>
-              <a:t>11/11/2025</a:t>
+              <a:t>16/11/2025</a:t>
             </a:fld>
             <a:endParaRPr lang="en-US"/>
           </a:p>
@@ -4550,7 +4556,7 @@
           <a:p>
             <a:fld id="{7F067AFB-E8F0-4146-902F-6EBBED2B273E}" type="datetimeFigureOut">
               <a:rPr lang="en-US" smtClean="0"/>
-              <a:t>11/11/2025</a:t>
+              <a:t>16/11/2025</a:t>
             </a:fld>
             <a:endParaRPr lang="en-US"/>
           </a:p>
@@ -4864,7 +4870,7 @@
           <a:p>
             <a:fld id="{7F067AFB-E8F0-4146-902F-6EBBED2B273E}" type="datetimeFigureOut">
               <a:rPr lang="en-US" smtClean="0"/>
-              <a:t>11/11/2025</a:t>
+              <a:t>16/11/2025</a:t>
             </a:fld>
             <a:endParaRPr lang="en-US"/>
           </a:p>
@@ -5257,7 +5263,7 @@
           <a:p>
             <a:fld id="{7F067AFB-E8F0-4146-902F-6EBBED2B273E}" type="datetimeFigureOut">
               <a:rPr lang="en-US" smtClean="0"/>
-              <a:t>11/11/2025</a:t>
+              <a:t>16/11/2025</a:t>
             </a:fld>
             <a:endParaRPr lang="en-US"/>
           </a:p>
@@ -5427,7 +5433,7 @@
           <a:p>
             <a:fld id="{7F067AFB-E8F0-4146-902F-6EBBED2B273E}" type="datetimeFigureOut">
               <a:rPr lang="en-US" smtClean="0"/>
-              <a:t>11/11/2025</a:t>
+              <a:t>16/11/2025</a:t>
             </a:fld>
             <a:endParaRPr lang="en-US"/>
           </a:p>
@@ -5607,7 +5613,7 @@
           <a:p>
             <a:fld id="{7F067AFB-E8F0-4146-902F-6EBBED2B273E}" type="datetimeFigureOut">
               <a:rPr lang="en-US" smtClean="0"/>
-              <a:t>11/11/2025</a:t>
+              <a:t>16/11/2025</a:t>
             </a:fld>
             <a:endParaRPr lang="en-US"/>
           </a:p>
@@ -5777,7 +5783,7 @@
           <a:p>
             <a:fld id="{7F067AFB-E8F0-4146-902F-6EBBED2B273E}" type="datetimeFigureOut">
               <a:rPr lang="en-US" smtClean="0"/>
-              <a:t>11/11/2025</a:t>
+              <a:t>16/11/2025</a:t>
             </a:fld>
             <a:endParaRPr lang="en-US"/>
           </a:p>
@@ -6024,7 +6030,7 @@
           <a:p>
             <a:fld id="{7F067AFB-E8F0-4146-902F-6EBBED2B273E}" type="datetimeFigureOut">
               <a:rPr lang="en-US" smtClean="0"/>
-              <a:t>11/11/2025</a:t>
+              <a:t>16/11/2025</a:t>
             </a:fld>
             <a:endParaRPr lang="en-US"/>
           </a:p>
@@ -6256,7 +6262,7 @@
           <a:p>
             <a:fld id="{7F067AFB-E8F0-4146-902F-6EBBED2B273E}" type="datetimeFigureOut">
               <a:rPr lang="en-US" smtClean="0"/>
-              <a:t>11/11/2025</a:t>
+              <a:t>16/11/2025</a:t>
             </a:fld>
             <a:endParaRPr lang="en-US"/>
           </a:p>
@@ -6630,7 +6636,7 @@
           <a:p>
             <a:fld id="{7F067AFB-E8F0-4146-902F-6EBBED2B273E}" type="datetimeFigureOut">
               <a:rPr lang="en-US" smtClean="0"/>
-              <a:t>11/11/2025</a:t>
+              <a:t>16/11/2025</a:t>
             </a:fld>
             <a:endParaRPr lang="en-US"/>
           </a:p>
@@ -6753,7 +6759,7 @@
           <a:p>
             <a:fld id="{7F067AFB-E8F0-4146-902F-6EBBED2B273E}" type="datetimeFigureOut">
               <a:rPr lang="en-US" smtClean="0"/>
-              <a:t>11/11/2025</a:t>
+              <a:t>16/11/2025</a:t>
             </a:fld>
             <a:endParaRPr lang="en-US"/>
           </a:p>
@@ -6848,7 +6854,7 @@
           <a:p>
             <a:fld id="{7F067AFB-E8F0-4146-902F-6EBBED2B273E}" type="datetimeFigureOut">
               <a:rPr lang="en-US" smtClean="0"/>
-              <a:t>11/11/2025</a:t>
+              <a:t>16/11/2025</a:t>
             </a:fld>
             <a:endParaRPr lang="en-US"/>
           </a:p>
@@ -7103,7 +7109,7 @@
           <a:p>
             <a:fld id="{7F067AFB-E8F0-4146-902F-6EBBED2B273E}" type="datetimeFigureOut">
               <a:rPr lang="en-US" smtClean="0"/>
-              <a:t>11/11/2025</a:t>
+              <a:t>16/11/2025</a:t>
             </a:fld>
             <a:endParaRPr lang="en-US"/>
           </a:p>
@@ -7408,7 +7414,7 @@
           <a:p>
             <a:fld id="{7F067AFB-E8F0-4146-902F-6EBBED2B273E}" type="datetimeFigureOut">
               <a:rPr lang="en-US" smtClean="0"/>
-              <a:t>11/11/2025</a:t>
+              <a:t>16/11/2025</a:t>
             </a:fld>
             <a:endParaRPr lang="en-US"/>
           </a:p>
@@ -8166,7 +8172,7 @@
           <a:p>
             <a:fld id="{7F067AFB-E8F0-4146-902F-6EBBED2B273E}" type="datetimeFigureOut">
               <a:rPr lang="en-US" smtClean="0"/>
-              <a:t>11/11/2025</a:t>
+              <a:t>16/11/2025</a:t>
             </a:fld>
             <a:endParaRPr lang="en-US"/>
           </a:p>
@@ -13166,7 +13172,7 @@
                 <a:latin typeface="Times New Roman" panose="02020603050405020304" pitchFamily="18" charset="0"/>
                 <a:cs typeface="Times New Roman" panose="02020603050405020304" pitchFamily="18" charset="0"/>
               </a:rPr>
-              <a:t>**word2vec** :		</a:t>
+              <a:t>word2vec:		</a:t>
             </a:r>
           </a:p>
           <a:p>
@@ -14478,44 +14484,6 @@
             </a:r>
           </a:p>
           <a:p>
-            <a:r>
-              <a:rPr lang="en-US" altLang="en-US" sz="2000" dirty="0">
-                <a:solidFill>
-                  <a:schemeClr val="tx1"/>
-                </a:solidFill>
-                <a:latin typeface="Times New Roman" panose="02020603050405020304" pitchFamily="18" charset="0"/>
-                <a:cs typeface="Times New Roman" panose="02020603050405020304" pitchFamily="18" charset="0"/>
-              </a:rPr>
-              <a:t>Example:</a:t>
-            </a:r>
-          </a:p>
-          <a:p>
-            <a:pPr lvl="1"/>
-            <a:r>
-              <a:rPr lang="en-US" altLang="en-US" sz="1800" dirty="0">
-                <a:solidFill>
-                  <a:schemeClr val="tx1"/>
-                </a:solidFill>
-                <a:latin typeface="Times New Roman" panose="02020603050405020304" pitchFamily="18" charset="0"/>
-                <a:cs typeface="Times New Roman" panose="02020603050405020304" pitchFamily="18" charset="0"/>
-              </a:rPr>
-              <a:t>PCA (Principal Component Analysis) reduces correlated features into fewer combined dimensions.</a:t>
-            </a:r>
-          </a:p>
-          <a:p>
-            <a:pPr lvl="1"/>
-            <a:r>
-              <a:rPr lang="en-US" altLang="en-US" sz="1800" dirty="0">
-                <a:solidFill>
-                  <a:schemeClr val="tx1"/>
-                </a:solidFill>
-                <a:latin typeface="Times New Roman" panose="02020603050405020304" pitchFamily="18" charset="0"/>
-                <a:cs typeface="Times New Roman" panose="02020603050405020304" pitchFamily="18" charset="0"/>
-              </a:rPr>
-              <a:t>Has even been used to create word embeddings from bag-of-words data.</a:t>
-            </a:r>
-          </a:p>
-          <a:p>
             <a:pPr marL="0" lvl="0" indent="0" defTabSz="914400" eaLnBrk="0" fontAlgn="base" hangingPunct="0">
               <a:spcBef>
                 <a:spcPct val="0"/>
@@ -15893,6 +15861,598 @@
           <p:cNvPr id="2" name="Title 1">
             <a:extLst>
               <a:ext uri="{FF2B5EF4-FFF2-40B4-BE49-F238E27FC236}">
+                <a16:creationId xmlns:a16="http://schemas.microsoft.com/office/drawing/2014/main" id="{C83A1599-6374-6850-D05E-FACB9892531F}"/>
+              </a:ext>
+            </a:extLst>
+          </p:cNvPr>
+          <p:cNvSpPr>
+            <a:spLocks noGrp="1"/>
+          </p:cNvSpPr>
+          <p:nvPr>
+            <p:ph type="title"/>
+          </p:nvPr>
+        </p:nvSpPr>
+        <p:spPr/>
+        <p:txBody>
+          <a:bodyPr/>
+          <a:lstStyle/>
+          <a:p>
+            <a:r>
+              <a:rPr lang="en-US" b="1" dirty="0"/>
+              <a:t>What Is a Transformer?</a:t>
+            </a:r>
+            <a:endParaRPr lang="en-US" dirty="0"/>
+          </a:p>
+        </p:txBody>
+      </p:sp>
+      <p:pic>
+        <p:nvPicPr>
+          <p:cNvPr id="9" name="Content Placeholder 8">
+            <a:extLst>
+              <a:ext uri="{FF2B5EF4-FFF2-40B4-BE49-F238E27FC236}">
+                <a16:creationId xmlns:a16="http://schemas.microsoft.com/office/drawing/2014/main" id="{5B323BF6-998B-48AD-BC16-532C16A64A79}"/>
+              </a:ext>
+            </a:extLst>
+          </p:cNvPr>
+          <p:cNvPicPr>
+            <a:picLocks noGrp="1" noChangeAspect="1"/>
+          </p:cNvPicPr>
+          <p:nvPr>
+            <p:ph idx="1"/>
+          </p:nvPr>
+        </p:nvPicPr>
+        <p:blipFill>
+          <a:blip r:embed="rId2">
+            <a:extLst>
+              <a:ext uri="{28A0092B-C50C-407E-A947-70E740481C1C}">
+                <a14:useLocalDpi xmlns:a14="http://schemas.microsoft.com/office/drawing/2010/main" val="0"/>
+              </a:ext>
+            </a:extLst>
+          </a:blip>
+          <a:stretch>
+            <a:fillRect/>
+          </a:stretch>
+        </p:blipFill>
+        <p:spPr>
+          <a:xfrm>
+            <a:off x="768991" y="2578100"/>
+            <a:ext cx="8218691" cy="2601685"/>
+          </a:xfrm>
+        </p:spPr>
+      </p:pic>
+    </p:spTree>
+    <p:extLst>
+      <p:ext uri="{BB962C8B-B14F-4D97-AF65-F5344CB8AC3E}">
+        <p14:creationId xmlns:p14="http://schemas.microsoft.com/office/powerpoint/2010/main" val="727758408"/>
+      </p:ext>
+    </p:extLst>
+  </p:cSld>
+  <p:clrMapOvr>
+    <a:masterClrMapping/>
+  </p:clrMapOvr>
+</p:sld>
+</file>
+
+<file path=ppt/slides/slide45.xml><?xml version="1.0" encoding="utf-8"?>
+<p:sld xmlns:a="http://schemas.openxmlformats.org/drawingml/2006/main" xmlns:r="http://schemas.openxmlformats.org/officeDocument/2006/relationships" xmlns:p="http://schemas.openxmlformats.org/presentationml/2006/main">
+  <p:cSld>
+    <p:spTree>
+      <p:nvGrpSpPr>
+        <p:cNvPr id="1" name=""/>
+        <p:cNvGrpSpPr/>
+        <p:nvPr/>
+      </p:nvGrpSpPr>
+      <p:grpSpPr>
+        <a:xfrm>
+          <a:off x="0" y="0"/>
+          <a:ext cx="0" cy="0"/>
+          <a:chOff x="0" y="0"/>
+          <a:chExt cx="0" cy="0"/>
+        </a:xfrm>
+      </p:grpSpPr>
+      <p:sp>
+        <p:nvSpPr>
+          <p:cNvPr id="2" name="Title 1">
+            <a:extLst>
+              <a:ext uri="{FF2B5EF4-FFF2-40B4-BE49-F238E27FC236}">
+                <a16:creationId xmlns:a16="http://schemas.microsoft.com/office/drawing/2014/main" id="{06D3AA47-C30A-7B15-7CE2-099B1B0C5734}"/>
+              </a:ext>
+            </a:extLst>
+          </p:cNvPr>
+          <p:cNvSpPr>
+            <a:spLocks noGrp="1"/>
+          </p:cNvSpPr>
+          <p:nvPr>
+            <p:ph type="title"/>
+          </p:nvPr>
+        </p:nvSpPr>
+        <p:spPr/>
+        <p:txBody>
+          <a:bodyPr/>
+          <a:lstStyle/>
+          <a:p>
+            <a:r>
+              <a:rPr lang="en-US" dirty="0"/>
+              <a:t>Encoder-only Models</a:t>
+            </a:r>
+          </a:p>
+        </p:txBody>
+      </p:sp>
+      <p:sp>
+        <p:nvSpPr>
+          <p:cNvPr id="3" name="Content Placeholder 2">
+            <a:extLst>
+              <a:ext uri="{FF2B5EF4-FFF2-40B4-BE49-F238E27FC236}">
+                <a16:creationId xmlns:a16="http://schemas.microsoft.com/office/drawing/2014/main" id="{506E7F3F-9865-6314-9E73-DCD66611A9E4}"/>
+              </a:ext>
+            </a:extLst>
+          </p:cNvPr>
+          <p:cNvSpPr>
+            <a:spLocks noGrp="1"/>
+          </p:cNvSpPr>
+          <p:nvPr>
+            <p:ph idx="1"/>
+          </p:nvPr>
+        </p:nvSpPr>
+        <p:spPr/>
+        <p:txBody>
+          <a:bodyPr/>
+          <a:lstStyle/>
+          <a:p>
+            <a:r>
+              <a:rPr lang="en-US" sz="2000" dirty="0">
+                <a:latin typeface="Times New Roman" panose="02020603050405020304" pitchFamily="18" charset="0"/>
+                <a:cs typeface="Times New Roman" panose="02020603050405020304" pitchFamily="18" charset="0"/>
+              </a:rPr>
+              <a:t>Read and understand text</a:t>
+            </a:r>
+          </a:p>
+          <a:p>
+            <a:r>
+              <a:rPr lang="en-US" sz="2000" dirty="0">
+                <a:latin typeface="Times New Roman" panose="02020603050405020304" pitchFamily="18" charset="0"/>
+                <a:cs typeface="Times New Roman" panose="02020603050405020304" pitchFamily="18" charset="0"/>
+              </a:rPr>
+              <a:t>Converts text → meaningful embeddings</a:t>
+            </a:r>
+          </a:p>
+          <a:p>
+            <a:pPr lvl="1"/>
+            <a:r>
+              <a:rPr lang="en-US" altLang="en-US" sz="2000" dirty="0">
+                <a:solidFill>
+                  <a:schemeClr val="tx1"/>
+                </a:solidFill>
+                <a:latin typeface="Times New Roman" panose="02020603050405020304" pitchFamily="18" charset="0"/>
+                <a:cs typeface="Times New Roman" panose="02020603050405020304" pitchFamily="18" charset="0"/>
+              </a:rPr>
+              <a:t>Finding meaning or intent</a:t>
+            </a:r>
+          </a:p>
+          <a:p>
+            <a:pPr lvl="1"/>
+            <a:r>
+              <a:rPr lang="en-US" altLang="en-US" sz="2000" dirty="0">
+                <a:solidFill>
+                  <a:schemeClr val="tx1"/>
+                </a:solidFill>
+                <a:latin typeface="Times New Roman" panose="02020603050405020304" pitchFamily="18" charset="0"/>
+                <a:cs typeface="Times New Roman" panose="02020603050405020304" pitchFamily="18" charset="0"/>
+              </a:rPr>
+              <a:t>Predicting missing words</a:t>
+            </a:r>
+          </a:p>
+          <a:p>
+            <a:r>
+              <a:rPr lang="en-US" altLang="en-US" sz="2000" dirty="0">
+                <a:solidFill>
+                  <a:schemeClr val="tx1"/>
+                </a:solidFill>
+                <a:latin typeface="Times New Roman" panose="02020603050405020304" pitchFamily="18" charset="0"/>
+                <a:cs typeface="Times New Roman" panose="02020603050405020304" pitchFamily="18" charset="0"/>
+              </a:rPr>
+              <a:t>Example:</a:t>
+            </a:r>
+          </a:p>
+          <a:p>
+            <a:pPr lvl="1"/>
+            <a:r>
+              <a:rPr lang="en-US" altLang="en-US" sz="2000" dirty="0">
+                <a:solidFill>
+                  <a:schemeClr val="tx1"/>
+                </a:solidFill>
+                <a:latin typeface="Times New Roman" panose="02020603050405020304" pitchFamily="18" charset="0"/>
+                <a:cs typeface="Times New Roman" panose="02020603050405020304" pitchFamily="18" charset="0"/>
+              </a:rPr>
+              <a:t>The cat is on the ___” → “mat”</a:t>
+            </a:r>
+          </a:p>
+          <a:p>
+            <a:pPr marL="0" lvl="0" indent="0" defTabSz="914400" eaLnBrk="0" fontAlgn="base" hangingPunct="0">
+              <a:spcBef>
+                <a:spcPct val="0"/>
+              </a:spcBef>
+              <a:spcAft>
+                <a:spcPct val="0"/>
+              </a:spcAft>
+              <a:buClrTx/>
+              <a:buSzTx/>
+              <a:buNone/>
+            </a:pPr>
+            <a:endParaRPr lang="en-US" altLang="en-US" dirty="0">
+              <a:solidFill>
+                <a:schemeClr val="tx1"/>
+              </a:solidFill>
+              <a:latin typeface="Arial" panose="020B0604020202020204" pitchFamily="34" charset="0"/>
+            </a:endParaRPr>
+          </a:p>
+          <a:p>
+            <a:endParaRPr lang="en-US" dirty="0"/>
+          </a:p>
+        </p:txBody>
+      </p:sp>
+    </p:spTree>
+    <p:extLst>
+      <p:ext uri="{BB962C8B-B14F-4D97-AF65-F5344CB8AC3E}">
+        <p14:creationId xmlns:p14="http://schemas.microsoft.com/office/powerpoint/2010/main" val="161639570"/>
+      </p:ext>
+    </p:extLst>
+  </p:cSld>
+  <p:clrMapOvr>
+    <a:masterClrMapping/>
+  </p:clrMapOvr>
+</p:sld>
+</file>
+
+<file path=ppt/slides/slide46.xml><?xml version="1.0" encoding="utf-8"?>
+<p:sld xmlns:a="http://schemas.openxmlformats.org/drawingml/2006/main" xmlns:r="http://schemas.openxmlformats.org/officeDocument/2006/relationships" xmlns:p="http://schemas.openxmlformats.org/presentationml/2006/main">
+  <p:cSld>
+    <p:spTree>
+      <p:nvGrpSpPr>
+        <p:cNvPr id="1" name=""/>
+        <p:cNvGrpSpPr/>
+        <p:nvPr/>
+      </p:nvGrpSpPr>
+      <p:grpSpPr>
+        <a:xfrm>
+          <a:off x="0" y="0"/>
+          <a:ext cx="0" cy="0"/>
+          <a:chOff x="0" y="0"/>
+          <a:chExt cx="0" cy="0"/>
+        </a:xfrm>
+      </p:grpSpPr>
+      <p:sp>
+        <p:nvSpPr>
+          <p:cNvPr id="2" name="Title 1">
+            <a:extLst>
+              <a:ext uri="{FF2B5EF4-FFF2-40B4-BE49-F238E27FC236}">
+                <a16:creationId xmlns:a16="http://schemas.microsoft.com/office/drawing/2014/main" id="{CA8907B6-1A04-A59B-4FEE-481CC84EDA32}"/>
+              </a:ext>
+            </a:extLst>
+          </p:cNvPr>
+          <p:cNvSpPr>
+            <a:spLocks noGrp="1"/>
+          </p:cNvSpPr>
+          <p:nvPr>
+            <p:ph type="title"/>
+          </p:nvPr>
+        </p:nvSpPr>
+        <p:spPr/>
+        <p:txBody>
+          <a:bodyPr/>
+          <a:lstStyle/>
+          <a:p>
+            <a:r>
+              <a:rPr lang="en-US" dirty="0"/>
+              <a:t>Intermediate Representation</a:t>
+            </a:r>
+          </a:p>
+        </p:txBody>
+      </p:sp>
+      <p:sp>
+        <p:nvSpPr>
+          <p:cNvPr id="3" name="Content Placeholder 2">
+            <a:extLst>
+              <a:ext uri="{FF2B5EF4-FFF2-40B4-BE49-F238E27FC236}">
+                <a16:creationId xmlns:a16="http://schemas.microsoft.com/office/drawing/2014/main" id="{02274D8F-4692-B55F-7362-45BA55C68DD9}"/>
+              </a:ext>
+            </a:extLst>
+          </p:cNvPr>
+          <p:cNvSpPr>
+            <a:spLocks noGrp="1"/>
+          </p:cNvSpPr>
+          <p:nvPr>
+            <p:ph idx="1"/>
+          </p:nvPr>
+        </p:nvSpPr>
+        <p:spPr/>
+        <p:txBody>
+          <a:bodyPr/>
+          <a:lstStyle/>
+          <a:p>
+            <a:r>
+              <a:rPr lang="en-US" dirty="0">
+                <a:latin typeface="Times New Roman" panose="02020603050405020304" pitchFamily="18" charset="0"/>
+                <a:cs typeface="Times New Roman" panose="02020603050405020304" pitchFamily="18" charset="0"/>
+              </a:rPr>
+              <a:t>It’s how the Transformer understands the input before giving an answer.</a:t>
+            </a:r>
+          </a:p>
+          <a:p>
+            <a:r>
+              <a:rPr lang="en-US" dirty="0">
+                <a:latin typeface="Times New Roman" panose="02020603050405020304" pitchFamily="18" charset="0"/>
+                <a:cs typeface="Times New Roman" panose="02020603050405020304" pitchFamily="18" charset="0"/>
+              </a:rPr>
+              <a:t>The encoder changes each word into numbers (vectors) that show meaning and context.</a:t>
+            </a:r>
+          </a:p>
+          <a:p>
+            <a:r>
+              <a:rPr lang="en-US" dirty="0">
+                <a:latin typeface="Times New Roman" panose="02020603050405020304" pitchFamily="18" charset="0"/>
+                <a:cs typeface="Times New Roman" panose="02020603050405020304" pitchFamily="18" charset="0"/>
+              </a:rPr>
+              <a:t>Example:</a:t>
+            </a:r>
+          </a:p>
+          <a:p>
+            <a:pPr lvl="1"/>
+            <a:r>
+              <a:rPr lang="en-US" sz="1800" dirty="0">
+                <a:latin typeface="Times New Roman" panose="02020603050405020304" pitchFamily="18" charset="0"/>
+                <a:cs typeface="Times New Roman" panose="02020603050405020304" pitchFamily="18" charset="0"/>
+              </a:rPr>
+              <a:t>“I” → [0.2, -0.4, 0.6, …]</a:t>
+            </a:r>
+          </a:p>
+          <a:p>
+            <a:pPr lvl="1"/>
+            <a:r>
+              <a:rPr lang="en-US" sz="1800" dirty="0">
+                <a:latin typeface="Times New Roman" panose="02020603050405020304" pitchFamily="18" charset="0"/>
+                <a:cs typeface="Times New Roman" panose="02020603050405020304" pitchFamily="18" charset="0"/>
+              </a:rPr>
+              <a:t>“am” → [-0.1, 0.5, -0.3, …]</a:t>
+            </a:r>
+          </a:p>
+          <a:p>
+            <a:pPr lvl="1"/>
+            <a:r>
+              <a:rPr lang="en-US" sz="1800" dirty="0">
+                <a:latin typeface="Times New Roman" panose="02020603050405020304" pitchFamily="18" charset="0"/>
+                <a:cs typeface="Times New Roman" panose="02020603050405020304" pitchFamily="18" charset="0"/>
+              </a:rPr>
+              <a:t>“hungry” → [0.7, -0.1, 0.8, …]</a:t>
+            </a:r>
+          </a:p>
+          <a:p>
+            <a:r>
+              <a:rPr lang="en-US" dirty="0">
+                <a:latin typeface="Times New Roman" panose="02020603050405020304" pitchFamily="18" charset="0"/>
+                <a:cs typeface="Times New Roman" panose="02020603050405020304" pitchFamily="18" charset="0"/>
+              </a:rPr>
+              <a:t>These numbers together are the model’s understanding of the sentence.</a:t>
+            </a:r>
+          </a:p>
+          <a:p>
+            <a:r>
+              <a:rPr lang="en-US" dirty="0">
+                <a:latin typeface="Times New Roman" panose="02020603050405020304" pitchFamily="18" charset="0"/>
+                <a:cs typeface="Times New Roman" panose="02020603050405020304" pitchFamily="18" charset="0"/>
+              </a:rPr>
+              <a:t>The decoder then uses this information to generate the output, like a translation or a response.</a:t>
+            </a:r>
+          </a:p>
+          <a:p>
+            <a:endParaRPr lang="en-US" dirty="0"/>
+          </a:p>
+        </p:txBody>
+      </p:sp>
+    </p:spTree>
+    <p:extLst>
+      <p:ext uri="{BB962C8B-B14F-4D97-AF65-F5344CB8AC3E}">
+        <p14:creationId xmlns:p14="http://schemas.microsoft.com/office/powerpoint/2010/main" val="2576391655"/>
+      </p:ext>
+    </p:extLst>
+  </p:cSld>
+  <p:clrMapOvr>
+    <a:masterClrMapping/>
+  </p:clrMapOvr>
+</p:sld>
+</file>
+
+<file path=ppt/slides/slide47.xml><?xml version="1.0" encoding="utf-8"?>
+<p:sld xmlns:a="http://schemas.openxmlformats.org/drawingml/2006/main" xmlns:r="http://schemas.openxmlformats.org/officeDocument/2006/relationships" xmlns:p="http://schemas.openxmlformats.org/presentationml/2006/main">
+  <p:cSld>
+    <p:spTree>
+      <p:nvGrpSpPr>
+        <p:cNvPr id="1" name=""/>
+        <p:cNvGrpSpPr/>
+        <p:nvPr/>
+      </p:nvGrpSpPr>
+      <p:grpSpPr>
+        <a:xfrm>
+          <a:off x="0" y="0"/>
+          <a:ext cx="0" cy="0"/>
+          <a:chOff x="0" y="0"/>
+          <a:chExt cx="0" cy="0"/>
+        </a:xfrm>
+      </p:grpSpPr>
+      <p:sp>
+        <p:nvSpPr>
+          <p:cNvPr id="2" name="Title 1">
+            <a:extLst>
+              <a:ext uri="{FF2B5EF4-FFF2-40B4-BE49-F238E27FC236}">
+                <a16:creationId xmlns:a16="http://schemas.microsoft.com/office/drawing/2014/main" id="{4FA1353F-BBF3-6001-3372-F3086B1910AA}"/>
+              </a:ext>
+            </a:extLst>
+          </p:cNvPr>
+          <p:cNvSpPr>
+            <a:spLocks noGrp="1"/>
+          </p:cNvSpPr>
+          <p:nvPr>
+            <p:ph type="title"/>
+          </p:nvPr>
+        </p:nvSpPr>
+        <p:spPr/>
+        <p:txBody>
+          <a:bodyPr/>
+          <a:lstStyle/>
+          <a:p>
+            <a:r>
+              <a:rPr lang="en-US" b="1" dirty="0"/>
+              <a:t>Decoder-only Models</a:t>
+            </a:r>
+            <a:br>
+              <a:rPr lang="en-US" b="1" dirty="0"/>
+            </a:br>
+            <a:endParaRPr lang="en-US" dirty="0"/>
+          </a:p>
+        </p:txBody>
+      </p:sp>
+      <p:sp>
+        <p:nvSpPr>
+          <p:cNvPr id="3" name="Content Placeholder 2">
+            <a:extLst>
+              <a:ext uri="{FF2B5EF4-FFF2-40B4-BE49-F238E27FC236}">
+                <a16:creationId xmlns:a16="http://schemas.microsoft.com/office/drawing/2014/main" id="{29B4BC51-F6D8-99A5-4CDB-42193D017B85}"/>
+              </a:ext>
+            </a:extLst>
+          </p:cNvPr>
+          <p:cNvSpPr>
+            <a:spLocks noGrp="1"/>
+          </p:cNvSpPr>
+          <p:nvPr>
+            <p:ph idx="1"/>
+          </p:nvPr>
+        </p:nvSpPr>
+        <p:spPr/>
+        <p:txBody>
+          <a:bodyPr/>
+          <a:lstStyle/>
+          <a:p>
+            <a:r>
+              <a:rPr lang="en-US" sz="2000" dirty="0">
+                <a:latin typeface="Times New Roman" panose="02020603050405020304" pitchFamily="18" charset="0"/>
+                <a:cs typeface="Times New Roman" panose="02020603050405020304" pitchFamily="18" charset="0"/>
+              </a:rPr>
+              <a:t>Generate text word by word</a:t>
+            </a:r>
+          </a:p>
+          <a:p>
+            <a:r>
+              <a:rPr lang="en-US" sz="2000" dirty="0">
+                <a:latin typeface="Times New Roman" panose="02020603050405020304" pitchFamily="18" charset="0"/>
+                <a:cs typeface="Times New Roman" panose="02020603050405020304" pitchFamily="18" charset="0"/>
+              </a:rPr>
+              <a:t>Looks at previous words </a:t>
+            </a:r>
+          </a:p>
+          <a:p>
+            <a:r>
+              <a:rPr lang="en-US" sz="2000" dirty="0">
+                <a:latin typeface="Times New Roman" panose="02020603050405020304" pitchFamily="18" charset="0"/>
+                <a:cs typeface="Times New Roman" panose="02020603050405020304" pitchFamily="18" charset="0"/>
+              </a:rPr>
+              <a:t>→ predicts next</a:t>
+            </a:r>
+          </a:p>
+          <a:p>
+            <a:r>
+              <a:rPr lang="en-US" altLang="en-US" sz="2000" dirty="0">
+                <a:solidFill>
+                  <a:schemeClr val="tx1"/>
+                </a:solidFill>
+                <a:latin typeface="Times New Roman" panose="02020603050405020304" pitchFamily="18" charset="0"/>
+                <a:cs typeface="Times New Roman" panose="02020603050405020304" pitchFamily="18" charset="0"/>
+              </a:rPr>
+              <a:t>Used for:</a:t>
+            </a:r>
+          </a:p>
+          <a:p>
+            <a:pPr lvl="1"/>
+            <a:r>
+              <a:rPr lang="en-US" altLang="en-US" sz="2000" dirty="0">
+                <a:solidFill>
+                  <a:schemeClr val="tx1"/>
+                </a:solidFill>
+                <a:latin typeface="Times New Roman" panose="02020603050405020304" pitchFamily="18" charset="0"/>
+                <a:cs typeface="Times New Roman" panose="02020603050405020304" pitchFamily="18" charset="0"/>
+              </a:rPr>
+              <a:t>Writing stories, chat replies, code</a:t>
+            </a:r>
+          </a:p>
+          <a:p>
+            <a:r>
+              <a:rPr lang="en-US" altLang="en-US" sz="2000" dirty="0">
+                <a:solidFill>
+                  <a:schemeClr val="tx1"/>
+                </a:solidFill>
+                <a:latin typeface="Times New Roman" panose="02020603050405020304" pitchFamily="18" charset="0"/>
+                <a:cs typeface="Times New Roman" panose="02020603050405020304" pitchFamily="18" charset="0"/>
+              </a:rPr>
+              <a:t>Example:</a:t>
+            </a:r>
+          </a:p>
+          <a:p>
+            <a:pPr lvl="1"/>
+            <a:r>
+              <a:rPr lang="en-US" sz="2000" dirty="0">
+                <a:latin typeface="Times New Roman" panose="02020603050405020304" pitchFamily="18" charset="0"/>
+                <a:cs typeface="Times New Roman" panose="02020603050405020304" pitchFamily="18" charset="0"/>
+              </a:rPr>
+              <a:t>“Once upon a time,” → “there was a small village by the sea.”</a:t>
+            </a:r>
+          </a:p>
+          <a:p>
+            <a:endParaRPr lang="en-US" altLang="en-US" dirty="0">
+              <a:solidFill>
+                <a:schemeClr val="tx1"/>
+              </a:solidFill>
+              <a:latin typeface="Arial" panose="020B0604020202020204" pitchFamily="34" charset="0"/>
+            </a:endParaRPr>
+          </a:p>
+          <a:p>
+            <a:endParaRPr lang="en-US" dirty="0"/>
+          </a:p>
+        </p:txBody>
+      </p:sp>
+    </p:spTree>
+    <p:extLst>
+      <p:ext uri="{BB962C8B-B14F-4D97-AF65-F5344CB8AC3E}">
+        <p14:creationId xmlns:p14="http://schemas.microsoft.com/office/powerpoint/2010/main" val="2191086237"/>
+      </p:ext>
+    </p:extLst>
+  </p:cSld>
+  <p:clrMapOvr>
+    <a:masterClrMapping/>
+  </p:clrMapOvr>
+</p:sld>
+</file>
+
+<file path=ppt/slides/slide48.xml><?xml version="1.0" encoding="utf-8"?>
+<p:sld xmlns:a="http://schemas.openxmlformats.org/drawingml/2006/main" xmlns:r="http://schemas.openxmlformats.org/officeDocument/2006/relationships" xmlns:p="http://schemas.openxmlformats.org/presentationml/2006/main">
+  <p:cSld>
+    <p:spTree>
+      <p:nvGrpSpPr>
+        <p:cNvPr id="1" name=""/>
+        <p:cNvGrpSpPr/>
+        <p:nvPr/>
+      </p:nvGrpSpPr>
+      <p:grpSpPr>
+        <a:xfrm>
+          <a:off x="0" y="0"/>
+          <a:ext cx="0" cy="0"/>
+          <a:chOff x="0" y="0"/>
+          <a:chExt cx="0" cy="0"/>
+        </a:xfrm>
+      </p:grpSpPr>
+      <p:sp>
+        <p:nvSpPr>
+          <p:cNvPr id="2" name="Title 1">
+            <a:extLst>
+              <a:ext uri="{FF2B5EF4-FFF2-40B4-BE49-F238E27FC236}">
                 <a16:creationId xmlns:a16="http://schemas.microsoft.com/office/drawing/2014/main" id="{06DECEAB-FD24-5E3A-ED85-9376FC7D2527}"/>
               </a:ext>
             </a:extLst>
@@ -15932,21 +16492,21 @@
             <p:ph idx="1"/>
             <p:extLst>
               <p:ext uri="{D42A27DB-BD31-4B8C-83A1-F6EECF244321}">
-                <p14:modId xmlns:p14="http://schemas.microsoft.com/office/powerpoint/2010/main" val="2300475725"/>
+                <p14:modId xmlns:p14="http://schemas.microsoft.com/office/powerpoint/2010/main" val="2836901584"/>
               </p:ext>
             </p:extLst>
           </p:nvPr>
         </p:nvGraphicFramePr>
         <p:xfrm>
-          <a:off x="677334" y="1930400"/>
-          <a:ext cx="7628464" cy="4297835"/>
+          <a:off x="914400" y="1950565"/>
+          <a:ext cx="7586270" cy="3598041"/>
         </p:xfrm>
         <a:graphic>
           <a:graphicData uri="http://schemas.openxmlformats.org/drawingml/2006/table">
             <a:tbl>
               <a:tblPr/>
               <a:tblGrid>
-                <a:gridCol w="1907116">
+                <a:gridCol w="1864922">
                   <a:extLst>
                     <a:ext uri="{9D8B030D-6E8A-4147-A177-3AD203B41FA5}">
                       <a16:colId xmlns:a16="http://schemas.microsoft.com/office/drawing/2014/main" val="1612506108"/>
@@ -16800,277 +17360,6 @@
                   </a:ext>
                 </a:extLst>
               </a:tr>
-              <a:tr h="638885">
-                <a:tc>
-                  <a:txBody>
-                    <a:bodyPr/>
-                    <a:lstStyle/>
-                    <a:p>
-                      <a:pPr>
-                        <a:buNone/>
-                      </a:pPr>
-                      <a:r>
-                        <a:rPr lang="en-US" sz="1400" b="1">
-                          <a:latin typeface="Times New Roman" panose="02020603050405020304" pitchFamily="18" charset="0"/>
-                          <a:cs typeface="Times New Roman" panose="02020603050405020304" pitchFamily="18" charset="0"/>
-                        </a:rPr>
-                        <a:t>LSTM / GRU</a:t>
-                      </a:r>
-                      <a:endParaRPr lang="en-US" sz="1400">
-                        <a:latin typeface="Times New Roman" panose="02020603050405020304" pitchFamily="18" charset="0"/>
-                        <a:cs typeface="Times New Roman" panose="02020603050405020304" pitchFamily="18" charset="0"/>
-                      </a:endParaRPr>
-                    </a:p>
-                  </a:txBody>
-                  <a:tcPr marL="59714" marR="59714" marT="29857" marB="29857" anchor="ctr">
-                    <a:lnL w="12700" cap="flat" cmpd="sng" algn="ctr">
-                      <a:solidFill>
-                        <a:schemeClr val="tx1"/>
-                      </a:solidFill>
-                      <a:prstDash val="solid"/>
-                      <a:round/>
-                      <a:headEnd type="none" w="med" len="med"/>
-                      <a:tailEnd type="none" w="med" len="med"/>
-                    </a:lnL>
-                    <a:lnR w="12700" cap="flat" cmpd="sng" algn="ctr">
-                      <a:solidFill>
-                        <a:schemeClr val="tx1"/>
-                      </a:solidFill>
-                      <a:prstDash val="solid"/>
-                      <a:round/>
-                      <a:headEnd type="none" w="med" len="med"/>
-                      <a:tailEnd type="none" w="med" len="med"/>
-                    </a:lnR>
-                    <a:lnT w="12700" cap="flat" cmpd="sng" algn="ctr">
-                      <a:solidFill>
-                        <a:schemeClr val="tx1"/>
-                      </a:solidFill>
-                      <a:prstDash val="solid"/>
-                      <a:round/>
-                      <a:headEnd type="none" w="med" len="med"/>
-                      <a:tailEnd type="none" w="med" len="med"/>
-                    </a:lnT>
-                    <a:lnB w="12700" cap="flat" cmpd="sng" algn="ctr">
-                      <a:solidFill>
-                        <a:schemeClr val="tx1"/>
-                      </a:solidFill>
-                      <a:prstDash val="solid"/>
-                      <a:round/>
-                      <a:headEnd type="none" w="med" len="med"/>
-                      <a:tailEnd type="none" w="med" len="med"/>
-                    </a:lnB>
-                    <a:lnTlToBr w="12700" cmpd="sng">
-                      <a:noFill/>
-                      <a:prstDash val="solid"/>
-                    </a:lnTlToBr>
-                    <a:lnBlToTr w="12700" cmpd="sng">
-                      <a:noFill/>
-                      <a:prstDash val="solid"/>
-                    </a:lnBlToTr>
-                    <a:noFill/>
-                  </a:tcPr>
-                </a:tc>
-                <a:tc>
-                  <a:txBody>
-                    <a:bodyPr/>
-                    <a:lstStyle/>
-                    <a:p>
-                      <a:pPr>
-                        <a:buNone/>
-                      </a:pPr>
-                      <a:r>
-                        <a:rPr lang="en-US" sz="1400">
-                          <a:latin typeface="Times New Roman" panose="02020603050405020304" pitchFamily="18" charset="0"/>
-                          <a:cs typeface="Times New Roman" panose="02020603050405020304" pitchFamily="18" charset="0"/>
-                        </a:rPr>
-                        <a:t>Improved RNNs</a:t>
-                      </a:r>
-                    </a:p>
-                  </a:txBody>
-                  <a:tcPr marL="59714" marR="59714" marT="29857" marB="29857" anchor="ctr">
-                    <a:lnL w="12700" cap="flat" cmpd="sng" algn="ctr">
-                      <a:solidFill>
-                        <a:schemeClr val="tx1"/>
-                      </a:solidFill>
-                      <a:prstDash val="solid"/>
-                      <a:round/>
-                      <a:headEnd type="none" w="med" len="med"/>
-                      <a:tailEnd type="none" w="med" len="med"/>
-                    </a:lnL>
-                    <a:lnR w="12700" cap="flat" cmpd="sng" algn="ctr">
-                      <a:solidFill>
-                        <a:schemeClr val="tx1"/>
-                      </a:solidFill>
-                      <a:prstDash val="solid"/>
-                      <a:round/>
-                      <a:headEnd type="none" w="med" len="med"/>
-                      <a:tailEnd type="none" w="med" len="med"/>
-                    </a:lnR>
-                    <a:lnT w="12700" cap="flat" cmpd="sng" algn="ctr">
-                      <a:solidFill>
-                        <a:schemeClr val="tx1"/>
-                      </a:solidFill>
-                      <a:prstDash val="solid"/>
-                      <a:round/>
-                      <a:headEnd type="none" w="med" len="med"/>
-                      <a:tailEnd type="none" w="med" len="med"/>
-                    </a:lnT>
-                    <a:lnB w="12700" cap="flat" cmpd="sng" algn="ctr">
-                      <a:solidFill>
-                        <a:schemeClr val="tx1"/>
-                      </a:solidFill>
-                      <a:prstDash val="solid"/>
-                      <a:round/>
-                      <a:headEnd type="none" w="med" len="med"/>
-                      <a:tailEnd type="none" w="med" len="med"/>
-                    </a:lnB>
-                    <a:lnTlToBr w="12700" cmpd="sng">
-                      <a:noFill/>
-                      <a:prstDash val="solid"/>
-                    </a:lnTlToBr>
-                    <a:lnBlToTr w="12700" cmpd="sng">
-                      <a:noFill/>
-                      <a:prstDash val="solid"/>
-                    </a:lnBlToTr>
-                    <a:noFill/>
-                  </a:tcPr>
-                </a:tc>
-                <a:tc>
-                  <a:txBody>
-                    <a:bodyPr/>
-                    <a:lstStyle/>
-                    <a:p>
-                      <a:pPr>
-                        <a:buNone/>
-                      </a:pPr>
-                      <a:r>
-                        <a:rPr lang="en-US" sz="1400">
-                          <a:latin typeface="Times New Roman" panose="02020603050405020304" pitchFamily="18" charset="0"/>
-                          <a:cs typeface="Times New Roman" panose="02020603050405020304" pitchFamily="18" charset="0"/>
-                        </a:rPr>
-                        <a:t>Special RNNs that can remember longer context.</a:t>
-                      </a:r>
-                    </a:p>
-                  </a:txBody>
-                  <a:tcPr marL="59714" marR="59714" marT="29857" marB="29857" anchor="ctr">
-                    <a:lnL w="12700" cap="flat" cmpd="sng" algn="ctr">
-                      <a:solidFill>
-                        <a:schemeClr val="tx1"/>
-                      </a:solidFill>
-                      <a:prstDash val="solid"/>
-                      <a:round/>
-                      <a:headEnd type="none" w="med" len="med"/>
-                      <a:tailEnd type="none" w="med" len="med"/>
-                    </a:lnL>
-                    <a:lnR w="12700" cap="flat" cmpd="sng" algn="ctr">
-                      <a:solidFill>
-                        <a:schemeClr val="tx1"/>
-                      </a:solidFill>
-                      <a:prstDash val="solid"/>
-                      <a:round/>
-                      <a:headEnd type="none" w="med" len="med"/>
-                      <a:tailEnd type="none" w="med" len="med"/>
-                    </a:lnR>
-                    <a:lnT w="12700" cap="flat" cmpd="sng" algn="ctr">
-                      <a:solidFill>
-                        <a:schemeClr val="tx1"/>
-                      </a:solidFill>
-                      <a:prstDash val="solid"/>
-                      <a:round/>
-                      <a:headEnd type="none" w="med" len="med"/>
-                      <a:tailEnd type="none" w="med" len="med"/>
-                    </a:lnT>
-                    <a:lnB w="12700" cap="flat" cmpd="sng" algn="ctr">
-                      <a:solidFill>
-                        <a:schemeClr val="tx1"/>
-                      </a:solidFill>
-                      <a:prstDash val="solid"/>
-                      <a:round/>
-                      <a:headEnd type="none" w="med" len="med"/>
-                      <a:tailEnd type="none" w="med" len="med"/>
-                    </a:lnB>
-                    <a:lnTlToBr w="12700" cmpd="sng">
-                      <a:noFill/>
-                      <a:prstDash val="solid"/>
-                    </a:lnTlToBr>
-                    <a:lnBlToTr w="12700" cmpd="sng">
-                      <a:noFill/>
-                      <a:prstDash val="solid"/>
-                    </a:lnBlToTr>
-                    <a:noFill/>
-                  </a:tcPr>
-                </a:tc>
-                <a:tc>
-                  <a:txBody>
-                    <a:bodyPr/>
-                    <a:lstStyle/>
-                    <a:p>
-                      <a:pPr>
-                        <a:buNone/>
-                      </a:pPr>
-                      <a:r>
-                        <a:rPr lang="en-US" sz="1400">
-                          <a:latin typeface="Times New Roman" panose="02020603050405020304" pitchFamily="18" charset="0"/>
-                          <a:cs typeface="Times New Roman" panose="02020603050405020304" pitchFamily="18" charset="0"/>
-                        </a:rPr>
-                        <a:t>Still slow and limited for very long texts.</a:t>
-                      </a:r>
-                    </a:p>
-                  </a:txBody>
-                  <a:tcPr marL="59714" marR="59714" marT="29857" marB="29857" anchor="ctr">
-                    <a:lnL w="12700" cap="flat" cmpd="sng" algn="ctr">
-                      <a:solidFill>
-                        <a:schemeClr val="tx1"/>
-                      </a:solidFill>
-                      <a:prstDash val="solid"/>
-                      <a:round/>
-                      <a:headEnd type="none" w="med" len="med"/>
-                      <a:tailEnd type="none" w="med" len="med"/>
-                    </a:lnL>
-                    <a:lnR w="12700" cap="flat" cmpd="sng" algn="ctr">
-                      <a:solidFill>
-                        <a:schemeClr val="tx1"/>
-                      </a:solidFill>
-                      <a:prstDash val="solid"/>
-                      <a:round/>
-                      <a:headEnd type="none" w="med" len="med"/>
-                      <a:tailEnd type="none" w="med" len="med"/>
-                    </a:lnR>
-                    <a:lnT w="12700" cap="flat" cmpd="sng" algn="ctr">
-                      <a:solidFill>
-                        <a:schemeClr val="tx1"/>
-                      </a:solidFill>
-                      <a:prstDash val="solid"/>
-                      <a:round/>
-                      <a:headEnd type="none" w="med" len="med"/>
-                      <a:tailEnd type="none" w="med" len="med"/>
-                    </a:lnT>
-                    <a:lnB w="12700" cap="flat" cmpd="sng" algn="ctr">
-                      <a:solidFill>
-                        <a:schemeClr val="tx1"/>
-                      </a:solidFill>
-                      <a:prstDash val="solid"/>
-                      <a:round/>
-                      <a:headEnd type="none" w="med" len="med"/>
-                      <a:tailEnd type="none" w="med" len="med"/>
-                    </a:lnB>
-                    <a:lnTlToBr w="12700" cmpd="sng">
-                      <a:noFill/>
-                      <a:prstDash val="solid"/>
-                    </a:lnTlToBr>
-                    <a:lnBlToTr w="12700" cmpd="sng">
-                      <a:noFill/>
-                      <a:prstDash val="solid"/>
-                    </a:lnBlToTr>
-                    <a:noFill/>
-                  </a:tcPr>
-                </a:tc>
-                <a:extLst>
-                  <a:ext uri="{0D108BD9-81ED-4DB2-BD59-A6C34878D82A}">
-                    <a16:rowId xmlns:a16="http://schemas.microsoft.com/office/drawing/2014/main" val="3108736429"/>
-                  </a:ext>
-                </a:extLst>
-              </a:tr>
               <a:tr h="830943">
                 <a:tc>
                   <a:txBody>
@@ -17081,13 +17370,13 @@
                         <a:buNone/>
                       </a:pPr>
                       <a:r>
-                        <a:rPr lang="en-US" sz="1400" b="1">
+                        <a:rPr lang="en-US" sz="1400" b="1" dirty="0">
                           <a:latin typeface="Times New Roman" panose="02020603050405020304" pitchFamily="18" charset="0"/>
                           <a:cs typeface="Times New Roman" panose="02020603050405020304" pitchFamily="18" charset="0"/>
                         </a:rPr>
                         <a:t>Transformers</a:t>
                       </a:r>
-                      <a:endParaRPr lang="en-US" sz="1400">
+                      <a:endParaRPr lang="en-US" sz="1400" dirty="0">
                         <a:latin typeface="Times New Roman" panose="02020603050405020304" pitchFamily="18" charset="0"/>
                         <a:cs typeface="Times New Roman" panose="02020603050405020304" pitchFamily="18" charset="0"/>
                       </a:endParaRPr>
@@ -17364,598 +17653,6 @@
     <p:extLst>
       <p:ext uri="{BB962C8B-B14F-4D97-AF65-F5344CB8AC3E}">
         <p14:creationId xmlns:p14="http://schemas.microsoft.com/office/powerpoint/2010/main" val="3367233281"/>
-      </p:ext>
-    </p:extLst>
-  </p:cSld>
-  <p:clrMapOvr>
-    <a:masterClrMapping/>
-  </p:clrMapOvr>
-</p:sld>
-</file>
-
-<file path=ppt/slides/slide45.xml><?xml version="1.0" encoding="utf-8"?>
-<p:sld xmlns:a="http://schemas.openxmlformats.org/drawingml/2006/main" xmlns:r="http://schemas.openxmlformats.org/officeDocument/2006/relationships" xmlns:p="http://schemas.openxmlformats.org/presentationml/2006/main">
-  <p:cSld>
-    <p:spTree>
-      <p:nvGrpSpPr>
-        <p:cNvPr id="1" name=""/>
-        <p:cNvGrpSpPr/>
-        <p:nvPr/>
-      </p:nvGrpSpPr>
-      <p:grpSpPr>
-        <a:xfrm>
-          <a:off x="0" y="0"/>
-          <a:ext cx="0" cy="0"/>
-          <a:chOff x="0" y="0"/>
-          <a:chExt cx="0" cy="0"/>
-        </a:xfrm>
-      </p:grpSpPr>
-      <p:sp>
-        <p:nvSpPr>
-          <p:cNvPr id="2" name="Title 1">
-            <a:extLst>
-              <a:ext uri="{FF2B5EF4-FFF2-40B4-BE49-F238E27FC236}">
-                <a16:creationId xmlns:a16="http://schemas.microsoft.com/office/drawing/2014/main" id="{C83A1599-6374-6850-D05E-FACB9892531F}"/>
-              </a:ext>
-            </a:extLst>
-          </p:cNvPr>
-          <p:cNvSpPr>
-            <a:spLocks noGrp="1"/>
-          </p:cNvSpPr>
-          <p:nvPr>
-            <p:ph type="title"/>
-          </p:nvPr>
-        </p:nvSpPr>
-        <p:spPr/>
-        <p:txBody>
-          <a:bodyPr/>
-          <a:lstStyle/>
-          <a:p>
-            <a:r>
-              <a:rPr lang="en-US" b="1" dirty="0"/>
-              <a:t>What Is a Transformer?</a:t>
-            </a:r>
-            <a:endParaRPr lang="en-US" dirty="0"/>
-          </a:p>
-        </p:txBody>
-      </p:sp>
-      <p:pic>
-        <p:nvPicPr>
-          <p:cNvPr id="9" name="Content Placeholder 8">
-            <a:extLst>
-              <a:ext uri="{FF2B5EF4-FFF2-40B4-BE49-F238E27FC236}">
-                <a16:creationId xmlns:a16="http://schemas.microsoft.com/office/drawing/2014/main" id="{5B323BF6-998B-48AD-BC16-532C16A64A79}"/>
-              </a:ext>
-            </a:extLst>
-          </p:cNvPr>
-          <p:cNvPicPr>
-            <a:picLocks noGrp="1" noChangeAspect="1"/>
-          </p:cNvPicPr>
-          <p:nvPr>
-            <p:ph idx="1"/>
-          </p:nvPr>
-        </p:nvPicPr>
-        <p:blipFill>
-          <a:blip r:embed="rId2">
-            <a:extLst>
-              <a:ext uri="{28A0092B-C50C-407E-A947-70E740481C1C}">
-                <a14:useLocalDpi xmlns:a14="http://schemas.microsoft.com/office/drawing/2010/main" val="0"/>
-              </a:ext>
-            </a:extLst>
-          </a:blip>
-          <a:stretch>
-            <a:fillRect/>
-          </a:stretch>
-        </p:blipFill>
-        <p:spPr>
-          <a:xfrm>
-            <a:off x="768991" y="2578100"/>
-            <a:ext cx="8218691" cy="2601685"/>
-          </a:xfrm>
-        </p:spPr>
-      </p:pic>
-    </p:spTree>
-    <p:extLst>
-      <p:ext uri="{BB962C8B-B14F-4D97-AF65-F5344CB8AC3E}">
-        <p14:creationId xmlns:p14="http://schemas.microsoft.com/office/powerpoint/2010/main" val="727758408"/>
-      </p:ext>
-    </p:extLst>
-  </p:cSld>
-  <p:clrMapOvr>
-    <a:masterClrMapping/>
-  </p:clrMapOvr>
-</p:sld>
-</file>
-
-<file path=ppt/slides/slide46.xml><?xml version="1.0" encoding="utf-8"?>
-<p:sld xmlns:a="http://schemas.openxmlformats.org/drawingml/2006/main" xmlns:r="http://schemas.openxmlformats.org/officeDocument/2006/relationships" xmlns:p="http://schemas.openxmlformats.org/presentationml/2006/main">
-  <p:cSld>
-    <p:spTree>
-      <p:nvGrpSpPr>
-        <p:cNvPr id="1" name=""/>
-        <p:cNvGrpSpPr/>
-        <p:nvPr/>
-      </p:nvGrpSpPr>
-      <p:grpSpPr>
-        <a:xfrm>
-          <a:off x="0" y="0"/>
-          <a:ext cx="0" cy="0"/>
-          <a:chOff x="0" y="0"/>
-          <a:chExt cx="0" cy="0"/>
-        </a:xfrm>
-      </p:grpSpPr>
-      <p:sp>
-        <p:nvSpPr>
-          <p:cNvPr id="2" name="Title 1">
-            <a:extLst>
-              <a:ext uri="{FF2B5EF4-FFF2-40B4-BE49-F238E27FC236}">
-                <a16:creationId xmlns:a16="http://schemas.microsoft.com/office/drawing/2014/main" id="{06D3AA47-C30A-7B15-7CE2-099B1B0C5734}"/>
-              </a:ext>
-            </a:extLst>
-          </p:cNvPr>
-          <p:cNvSpPr>
-            <a:spLocks noGrp="1"/>
-          </p:cNvSpPr>
-          <p:nvPr>
-            <p:ph type="title"/>
-          </p:nvPr>
-        </p:nvSpPr>
-        <p:spPr/>
-        <p:txBody>
-          <a:bodyPr/>
-          <a:lstStyle/>
-          <a:p>
-            <a:r>
-              <a:rPr lang="en-US" dirty="0"/>
-              <a:t>Encoder-only Models</a:t>
-            </a:r>
-          </a:p>
-        </p:txBody>
-      </p:sp>
-      <p:sp>
-        <p:nvSpPr>
-          <p:cNvPr id="3" name="Content Placeholder 2">
-            <a:extLst>
-              <a:ext uri="{FF2B5EF4-FFF2-40B4-BE49-F238E27FC236}">
-                <a16:creationId xmlns:a16="http://schemas.microsoft.com/office/drawing/2014/main" id="{506E7F3F-9865-6314-9E73-DCD66611A9E4}"/>
-              </a:ext>
-            </a:extLst>
-          </p:cNvPr>
-          <p:cNvSpPr>
-            <a:spLocks noGrp="1"/>
-          </p:cNvSpPr>
-          <p:nvPr>
-            <p:ph idx="1"/>
-          </p:nvPr>
-        </p:nvSpPr>
-        <p:spPr/>
-        <p:txBody>
-          <a:bodyPr/>
-          <a:lstStyle/>
-          <a:p>
-            <a:r>
-              <a:rPr lang="en-US" sz="2000" dirty="0">
-                <a:latin typeface="Times New Roman" panose="02020603050405020304" pitchFamily="18" charset="0"/>
-                <a:cs typeface="Times New Roman" panose="02020603050405020304" pitchFamily="18" charset="0"/>
-              </a:rPr>
-              <a:t>Read and understand text</a:t>
-            </a:r>
-          </a:p>
-          <a:p>
-            <a:r>
-              <a:rPr lang="en-US" sz="2000" dirty="0">
-                <a:latin typeface="Times New Roman" panose="02020603050405020304" pitchFamily="18" charset="0"/>
-                <a:cs typeface="Times New Roman" panose="02020603050405020304" pitchFamily="18" charset="0"/>
-              </a:rPr>
-              <a:t>Converts text → meaningful embeddings</a:t>
-            </a:r>
-          </a:p>
-          <a:p>
-            <a:pPr lvl="1"/>
-            <a:r>
-              <a:rPr lang="en-US" altLang="en-US" sz="2000" dirty="0">
-                <a:solidFill>
-                  <a:schemeClr val="tx1"/>
-                </a:solidFill>
-                <a:latin typeface="Times New Roman" panose="02020603050405020304" pitchFamily="18" charset="0"/>
-                <a:cs typeface="Times New Roman" panose="02020603050405020304" pitchFamily="18" charset="0"/>
-              </a:rPr>
-              <a:t>Finding meaning or intent</a:t>
-            </a:r>
-          </a:p>
-          <a:p>
-            <a:pPr lvl="1"/>
-            <a:r>
-              <a:rPr lang="en-US" altLang="en-US" sz="2000" dirty="0">
-                <a:solidFill>
-                  <a:schemeClr val="tx1"/>
-                </a:solidFill>
-                <a:latin typeface="Times New Roman" panose="02020603050405020304" pitchFamily="18" charset="0"/>
-                <a:cs typeface="Times New Roman" panose="02020603050405020304" pitchFamily="18" charset="0"/>
-              </a:rPr>
-              <a:t>Predicting missing words</a:t>
-            </a:r>
-          </a:p>
-          <a:p>
-            <a:r>
-              <a:rPr lang="en-US" altLang="en-US" sz="2000" dirty="0">
-                <a:solidFill>
-                  <a:schemeClr val="tx1"/>
-                </a:solidFill>
-                <a:latin typeface="Times New Roman" panose="02020603050405020304" pitchFamily="18" charset="0"/>
-                <a:cs typeface="Times New Roman" panose="02020603050405020304" pitchFamily="18" charset="0"/>
-              </a:rPr>
-              <a:t>Example:</a:t>
-            </a:r>
-          </a:p>
-          <a:p>
-            <a:pPr lvl="1"/>
-            <a:r>
-              <a:rPr lang="en-US" altLang="en-US" sz="2000" dirty="0">
-                <a:solidFill>
-                  <a:schemeClr val="tx1"/>
-                </a:solidFill>
-                <a:latin typeface="Times New Roman" panose="02020603050405020304" pitchFamily="18" charset="0"/>
-                <a:cs typeface="Times New Roman" panose="02020603050405020304" pitchFamily="18" charset="0"/>
-              </a:rPr>
-              <a:t>The cat is on the ___” → “mat”</a:t>
-            </a:r>
-          </a:p>
-          <a:p>
-            <a:pPr marL="0" lvl="0" indent="0" defTabSz="914400" eaLnBrk="0" fontAlgn="base" hangingPunct="0">
-              <a:spcBef>
-                <a:spcPct val="0"/>
-              </a:spcBef>
-              <a:spcAft>
-                <a:spcPct val="0"/>
-              </a:spcAft>
-              <a:buClrTx/>
-              <a:buSzTx/>
-              <a:buNone/>
-            </a:pPr>
-            <a:endParaRPr lang="en-US" altLang="en-US" dirty="0">
-              <a:solidFill>
-                <a:schemeClr val="tx1"/>
-              </a:solidFill>
-              <a:latin typeface="Arial" panose="020B0604020202020204" pitchFamily="34" charset="0"/>
-            </a:endParaRPr>
-          </a:p>
-          <a:p>
-            <a:endParaRPr lang="en-US" dirty="0"/>
-          </a:p>
-        </p:txBody>
-      </p:sp>
-    </p:spTree>
-    <p:extLst>
-      <p:ext uri="{BB962C8B-B14F-4D97-AF65-F5344CB8AC3E}">
-        <p14:creationId xmlns:p14="http://schemas.microsoft.com/office/powerpoint/2010/main" val="161639570"/>
-      </p:ext>
-    </p:extLst>
-  </p:cSld>
-  <p:clrMapOvr>
-    <a:masterClrMapping/>
-  </p:clrMapOvr>
-</p:sld>
-</file>
-
-<file path=ppt/slides/slide47.xml><?xml version="1.0" encoding="utf-8"?>
-<p:sld xmlns:a="http://schemas.openxmlformats.org/drawingml/2006/main" xmlns:r="http://schemas.openxmlformats.org/officeDocument/2006/relationships" xmlns:p="http://schemas.openxmlformats.org/presentationml/2006/main">
-  <p:cSld>
-    <p:spTree>
-      <p:nvGrpSpPr>
-        <p:cNvPr id="1" name=""/>
-        <p:cNvGrpSpPr/>
-        <p:nvPr/>
-      </p:nvGrpSpPr>
-      <p:grpSpPr>
-        <a:xfrm>
-          <a:off x="0" y="0"/>
-          <a:ext cx="0" cy="0"/>
-          <a:chOff x="0" y="0"/>
-          <a:chExt cx="0" cy="0"/>
-        </a:xfrm>
-      </p:grpSpPr>
-      <p:sp>
-        <p:nvSpPr>
-          <p:cNvPr id="2" name="Title 1">
-            <a:extLst>
-              <a:ext uri="{FF2B5EF4-FFF2-40B4-BE49-F238E27FC236}">
-                <a16:creationId xmlns:a16="http://schemas.microsoft.com/office/drawing/2014/main" id="{4FA1353F-BBF3-6001-3372-F3086B1910AA}"/>
-              </a:ext>
-            </a:extLst>
-          </p:cNvPr>
-          <p:cNvSpPr>
-            <a:spLocks noGrp="1"/>
-          </p:cNvSpPr>
-          <p:nvPr>
-            <p:ph type="title"/>
-          </p:nvPr>
-        </p:nvSpPr>
-        <p:spPr/>
-        <p:txBody>
-          <a:bodyPr/>
-          <a:lstStyle/>
-          <a:p>
-            <a:r>
-              <a:rPr lang="en-US" b="1" dirty="0"/>
-              <a:t>Decoder-only Models</a:t>
-            </a:r>
-            <a:br>
-              <a:rPr lang="en-US" b="1" dirty="0"/>
-            </a:br>
-            <a:endParaRPr lang="en-US" dirty="0"/>
-          </a:p>
-        </p:txBody>
-      </p:sp>
-      <p:sp>
-        <p:nvSpPr>
-          <p:cNvPr id="3" name="Content Placeholder 2">
-            <a:extLst>
-              <a:ext uri="{FF2B5EF4-FFF2-40B4-BE49-F238E27FC236}">
-                <a16:creationId xmlns:a16="http://schemas.microsoft.com/office/drawing/2014/main" id="{29B4BC51-F6D8-99A5-4CDB-42193D017B85}"/>
-              </a:ext>
-            </a:extLst>
-          </p:cNvPr>
-          <p:cNvSpPr>
-            <a:spLocks noGrp="1"/>
-          </p:cNvSpPr>
-          <p:nvPr>
-            <p:ph idx="1"/>
-          </p:nvPr>
-        </p:nvSpPr>
-        <p:spPr/>
-        <p:txBody>
-          <a:bodyPr/>
-          <a:lstStyle/>
-          <a:p>
-            <a:r>
-              <a:rPr lang="en-US" sz="2000" dirty="0">
-                <a:latin typeface="Times New Roman" panose="02020603050405020304" pitchFamily="18" charset="0"/>
-                <a:cs typeface="Times New Roman" panose="02020603050405020304" pitchFamily="18" charset="0"/>
-              </a:rPr>
-              <a:t>Generate text word by word</a:t>
-            </a:r>
-          </a:p>
-          <a:p>
-            <a:r>
-              <a:rPr lang="en-US" sz="2000" dirty="0">
-                <a:latin typeface="Times New Roman" panose="02020603050405020304" pitchFamily="18" charset="0"/>
-                <a:cs typeface="Times New Roman" panose="02020603050405020304" pitchFamily="18" charset="0"/>
-              </a:rPr>
-              <a:t>Looks at previous words </a:t>
-            </a:r>
-          </a:p>
-          <a:p>
-            <a:r>
-              <a:rPr lang="en-US" sz="2000" dirty="0">
-                <a:latin typeface="Times New Roman" panose="02020603050405020304" pitchFamily="18" charset="0"/>
-                <a:cs typeface="Times New Roman" panose="02020603050405020304" pitchFamily="18" charset="0"/>
-              </a:rPr>
-              <a:t>→ predicts next</a:t>
-            </a:r>
-          </a:p>
-          <a:p>
-            <a:r>
-              <a:rPr lang="en-US" altLang="en-US" sz="2000" dirty="0">
-                <a:solidFill>
-                  <a:schemeClr val="tx1"/>
-                </a:solidFill>
-                <a:latin typeface="Times New Roman" panose="02020603050405020304" pitchFamily="18" charset="0"/>
-                <a:cs typeface="Times New Roman" panose="02020603050405020304" pitchFamily="18" charset="0"/>
-              </a:rPr>
-              <a:t>Used for:</a:t>
-            </a:r>
-          </a:p>
-          <a:p>
-            <a:pPr lvl="1"/>
-            <a:r>
-              <a:rPr lang="en-US" altLang="en-US" sz="2000" dirty="0">
-                <a:solidFill>
-                  <a:schemeClr val="tx1"/>
-                </a:solidFill>
-                <a:latin typeface="Times New Roman" panose="02020603050405020304" pitchFamily="18" charset="0"/>
-                <a:cs typeface="Times New Roman" panose="02020603050405020304" pitchFamily="18" charset="0"/>
-              </a:rPr>
-              <a:t>Writing stories, chat replies, code</a:t>
-            </a:r>
-          </a:p>
-          <a:p>
-            <a:r>
-              <a:rPr lang="en-US" altLang="en-US" sz="2000" dirty="0">
-                <a:solidFill>
-                  <a:schemeClr val="tx1"/>
-                </a:solidFill>
-                <a:latin typeface="Times New Roman" panose="02020603050405020304" pitchFamily="18" charset="0"/>
-                <a:cs typeface="Times New Roman" panose="02020603050405020304" pitchFamily="18" charset="0"/>
-              </a:rPr>
-              <a:t>Example:</a:t>
-            </a:r>
-          </a:p>
-          <a:p>
-            <a:pPr lvl="1"/>
-            <a:r>
-              <a:rPr lang="en-US" sz="2000" dirty="0">
-                <a:latin typeface="Times New Roman" panose="02020603050405020304" pitchFamily="18" charset="0"/>
-                <a:cs typeface="Times New Roman" panose="02020603050405020304" pitchFamily="18" charset="0"/>
-              </a:rPr>
-              <a:t>“Once upon a time,” → “there was a small village by the sea.”</a:t>
-            </a:r>
-          </a:p>
-          <a:p>
-            <a:endParaRPr lang="en-US" altLang="en-US" dirty="0">
-              <a:solidFill>
-                <a:schemeClr val="tx1"/>
-              </a:solidFill>
-              <a:latin typeface="Arial" panose="020B0604020202020204" pitchFamily="34" charset="0"/>
-            </a:endParaRPr>
-          </a:p>
-          <a:p>
-            <a:endParaRPr lang="en-US" dirty="0"/>
-          </a:p>
-        </p:txBody>
-      </p:sp>
-    </p:spTree>
-    <p:extLst>
-      <p:ext uri="{BB962C8B-B14F-4D97-AF65-F5344CB8AC3E}">
-        <p14:creationId xmlns:p14="http://schemas.microsoft.com/office/powerpoint/2010/main" val="2191086237"/>
-      </p:ext>
-    </p:extLst>
-  </p:cSld>
-  <p:clrMapOvr>
-    <a:masterClrMapping/>
-  </p:clrMapOvr>
-</p:sld>
-</file>
-
-<file path=ppt/slides/slide48.xml><?xml version="1.0" encoding="utf-8"?>
-<p:sld xmlns:a="http://schemas.openxmlformats.org/drawingml/2006/main" xmlns:r="http://schemas.openxmlformats.org/officeDocument/2006/relationships" xmlns:p="http://schemas.openxmlformats.org/presentationml/2006/main">
-  <p:cSld>
-    <p:spTree>
-      <p:nvGrpSpPr>
-        <p:cNvPr id="1" name=""/>
-        <p:cNvGrpSpPr/>
-        <p:nvPr/>
-      </p:nvGrpSpPr>
-      <p:grpSpPr>
-        <a:xfrm>
-          <a:off x="0" y="0"/>
-          <a:ext cx="0" cy="0"/>
-          <a:chOff x="0" y="0"/>
-          <a:chExt cx="0" cy="0"/>
-        </a:xfrm>
-      </p:grpSpPr>
-      <p:sp>
-        <p:nvSpPr>
-          <p:cNvPr id="2" name="Title 1">
-            <a:extLst>
-              <a:ext uri="{FF2B5EF4-FFF2-40B4-BE49-F238E27FC236}">
-                <a16:creationId xmlns:a16="http://schemas.microsoft.com/office/drawing/2014/main" id="{CA8907B6-1A04-A59B-4FEE-481CC84EDA32}"/>
-              </a:ext>
-            </a:extLst>
-          </p:cNvPr>
-          <p:cNvSpPr>
-            <a:spLocks noGrp="1"/>
-          </p:cNvSpPr>
-          <p:nvPr>
-            <p:ph type="title"/>
-          </p:nvPr>
-        </p:nvSpPr>
-        <p:spPr/>
-        <p:txBody>
-          <a:bodyPr/>
-          <a:lstStyle/>
-          <a:p>
-            <a:r>
-              <a:rPr lang="en-US" dirty="0"/>
-              <a:t>Intermediate Representation</a:t>
-            </a:r>
-          </a:p>
-        </p:txBody>
-      </p:sp>
-      <p:sp>
-        <p:nvSpPr>
-          <p:cNvPr id="3" name="Content Placeholder 2">
-            <a:extLst>
-              <a:ext uri="{FF2B5EF4-FFF2-40B4-BE49-F238E27FC236}">
-                <a16:creationId xmlns:a16="http://schemas.microsoft.com/office/drawing/2014/main" id="{02274D8F-4692-B55F-7362-45BA55C68DD9}"/>
-              </a:ext>
-            </a:extLst>
-          </p:cNvPr>
-          <p:cNvSpPr>
-            <a:spLocks noGrp="1"/>
-          </p:cNvSpPr>
-          <p:nvPr>
-            <p:ph idx="1"/>
-          </p:nvPr>
-        </p:nvSpPr>
-        <p:spPr/>
-        <p:txBody>
-          <a:bodyPr/>
-          <a:lstStyle/>
-          <a:p>
-            <a:r>
-              <a:rPr lang="en-US" dirty="0">
-                <a:latin typeface="Times New Roman" panose="02020603050405020304" pitchFamily="18" charset="0"/>
-                <a:cs typeface="Times New Roman" panose="02020603050405020304" pitchFamily="18" charset="0"/>
-              </a:rPr>
-              <a:t>It’s how the Transformer understands the input before giving an answer.</a:t>
-            </a:r>
-          </a:p>
-          <a:p>
-            <a:r>
-              <a:rPr lang="en-US" dirty="0">
-                <a:latin typeface="Times New Roman" panose="02020603050405020304" pitchFamily="18" charset="0"/>
-                <a:cs typeface="Times New Roman" panose="02020603050405020304" pitchFamily="18" charset="0"/>
-              </a:rPr>
-              <a:t>The encoder changes each word into numbers (vectors) that show meaning and context.</a:t>
-            </a:r>
-          </a:p>
-          <a:p>
-            <a:r>
-              <a:rPr lang="en-US" dirty="0">
-                <a:latin typeface="Times New Roman" panose="02020603050405020304" pitchFamily="18" charset="0"/>
-                <a:cs typeface="Times New Roman" panose="02020603050405020304" pitchFamily="18" charset="0"/>
-              </a:rPr>
-              <a:t>Example:</a:t>
-            </a:r>
-          </a:p>
-          <a:p>
-            <a:pPr lvl="1"/>
-            <a:r>
-              <a:rPr lang="en-US" sz="1800" dirty="0">
-                <a:latin typeface="Times New Roman" panose="02020603050405020304" pitchFamily="18" charset="0"/>
-                <a:cs typeface="Times New Roman" panose="02020603050405020304" pitchFamily="18" charset="0"/>
-              </a:rPr>
-              <a:t>“I” → [0.2, -0.4, 0.6, …]</a:t>
-            </a:r>
-          </a:p>
-          <a:p>
-            <a:pPr lvl="1"/>
-            <a:r>
-              <a:rPr lang="en-US" sz="1800" dirty="0">
-                <a:latin typeface="Times New Roman" panose="02020603050405020304" pitchFamily="18" charset="0"/>
-                <a:cs typeface="Times New Roman" panose="02020603050405020304" pitchFamily="18" charset="0"/>
-              </a:rPr>
-              <a:t>“am” → [-0.1, 0.5, -0.3, …]</a:t>
-            </a:r>
-          </a:p>
-          <a:p>
-            <a:pPr lvl="1"/>
-            <a:r>
-              <a:rPr lang="en-US" sz="1800" dirty="0">
-                <a:latin typeface="Times New Roman" panose="02020603050405020304" pitchFamily="18" charset="0"/>
-                <a:cs typeface="Times New Roman" panose="02020603050405020304" pitchFamily="18" charset="0"/>
-              </a:rPr>
-              <a:t>“hungry” → [0.7, -0.1, 0.8, …]</a:t>
-            </a:r>
-          </a:p>
-          <a:p>
-            <a:r>
-              <a:rPr lang="en-US" dirty="0">
-                <a:latin typeface="Times New Roman" panose="02020603050405020304" pitchFamily="18" charset="0"/>
-                <a:cs typeface="Times New Roman" panose="02020603050405020304" pitchFamily="18" charset="0"/>
-              </a:rPr>
-              <a:t>These numbers together are the model’s understanding of the sentence.</a:t>
-            </a:r>
-          </a:p>
-          <a:p>
-            <a:r>
-              <a:rPr lang="en-US" dirty="0">
-                <a:latin typeface="Times New Roman" panose="02020603050405020304" pitchFamily="18" charset="0"/>
-                <a:cs typeface="Times New Roman" panose="02020603050405020304" pitchFamily="18" charset="0"/>
-              </a:rPr>
-              <a:t>The decoder then uses this information to generate the output, like a translation or a response.</a:t>
-            </a:r>
-          </a:p>
-          <a:p>
-            <a:endParaRPr lang="en-US" dirty="0"/>
-          </a:p>
-        </p:txBody>
-      </p:sp>
-    </p:spTree>
-    <p:extLst>
-      <p:ext uri="{BB962C8B-B14F-4D97-AF65-F5344CB8AC3E}">
-        <p14:creationId xmlns:p14="http://schemas.microsoft.com/office/powerpoint/2010/main" val="2576391655"/>
       </p:ext>
     </p:extLst>
   </p:cSld>
@@ -20539,7 +20236,7 @@
                 <a:latin typeface="Times New Roman" panose="02020603050405020304" pitchFamily="18" charset="0"/>
                 <a:cs typeface="Times New Roman" panose="02020603050405020304" pitchFamily="18" charset="0"/>
               </a:rPr>
-              <a:t>f(x)=1/(1+e−x6-x)</a:t>
+              <a:t>f(x)=1/(1+e^-x)</a:t>
             </a:r>
           </a:p>
           <a:p>

</xml_diff>